<commit_message>
Third commit (git cheatsheet)
</commit_message>
<xml_diff>
--- a/GitPresentation.pptx
+++ b/GitPresentation.pptx
@@ -5,7 +5,7 @@
     <p:sldMasterId id="2147483648" r:id="rId1"/>
   </p:sldMasterIdLst>
   <p:notesMasterIdLst>
-    <p:notesMasterId r:id="rId12"/>
+    <p:notesMasterId r:id="rId13"/>
   </p:notesMasterIdLst>
   <p:sldIdLst>
     <p:sldId id="256" r:id="rId2"/>
@@ -18,6 +18,7 @@
     <p:sldId id="263" r:id="rId9"/>
     <p:sldId id="265" r:id="rId10"/>
     <p:sldId id="266" r:id="rId11"/>
+    <p:sldId id="267" r:id="rId12"/>
   </p:sldIdLst>
   <p:sldSz cx="12192000" cy="6858000"/>
   <p:notesSz cx="6858000" cy="9144000"/>
@@ -131,6 +132,7 @@
             <p14:sldId id="263"/>
             <p14:sldId id="265"/>
             <p14:sldId id="266"/>
+            <p14:sldId id="267"/>
           </p14:sldIdLst>
         </p14:section>
         <p14:section name="Untitled Section" id="{DE0064B8-87C6-45E0-A7D7-91A80B4EE805}">
@@ -13671,7 +13673,7 @@
           <a:p>
             <a:fld id="{ABD394DA-56AE-4D1D-9876-7C8B6A37420B}" type="datetimeFigureOut">
               <a:rPr lang="en-US" smtClean="0"/>
-              <a:t>11/20/2024</a:t>
+              <a:t>11/22/2024</a:t>
             </a:fld>
             <a:endParaRPr lang="en-US"/>
           </a:p>
@@ -14169,7 +14171,7 @@
           <a:p>
             <a:fld id="{1313E132-71B5-4FE0-AADE-089BA2720B0D}" type="datetimeFigureOut">
               <a:rPr lang="en-US" smtClean="0"/>
-              <a:t>11/20/2024</a:t>
+              <a:t>11/22/2024</a:t>
             </a:fld>
             <a:endParaRPr lang="en-US"/>
           </a:p>
@@ -14367,7 +14369,7 @@
           <a:p>
             <a:fld id="{1313E132-71B5-4FE0-AADE-089BA2720B0D}" type="datetimeFigureOut">
               <a:rPr lang="en-US" smtClean="0"/>
-              <a:t>11/20/2024</a:t>
+              <a:t>11/22/2024</a:t>
             </a:fld>
             <a:endParaRPr lang="en-US"/>
           </a:p>
@@ -14575,7 +14577,7 @@
           <a:p>
             <a:fld id="{1313E132-71B5-4FE0-AADE-089BA2720B0D}" type="datetimeFigureOut">
               <a:rPr lang="en-US" smtClean="0"/>
-              <a:t>11/20/2024</a:t>
+              <a:t>11/22/2024</a:t>
             </a:fld>
             <a:endParaRPr lang="en-US"/>
           </a:p>
@@ -14773,7 +14775,7 @@
           <a:p>
             <a:fld id="{1313E132-71B5-4FE0-AADE-089BA2720B0D}" type="datetimeFigureOut">
               <a:rPr lang="en-US" smtClean="0"/>
-              <a:t>11/20/2024</a:t>
+              <a:t>11/22/2024</a:t>
             </a:fld>
             <a:endParaRPr lang="en-US"/>
           </a:p>
@@ -15048,7 +15050,7 @@
           <a:p>
             <a:fld id="{1313E132-71B5-4FE0-AADE-089BA2720B0D}" type="datetimeFigureOut">
               <a:rPr lang="en-US" smtClean="0"/>
-              <a:t>11/20/2024</a:t>
+              <a:t>11/22/2024</a:t>
             </a:fld>
             <a:endParaRPr lang="en-US"/>
           </a:p>
@@ -15313,7 +15315,7 @@
           <a:p>
             <a:fld id="{1313E132-71B5-4FE0-AADE-089BA2720B0D}" type="datetimeFigureOut">
               <a:rPr lang="en-US" smtClean="0"/>
-              <a:t>11/20/2024</a:t>
+              <a:t>11/22/2024</a:t>
             </a:fld>
             <a:endParaRPr lang="en-US"/>
           </a:p>
@@ -15725,7 +15727,7 @@
           <a:p>
             <a:fld id="{1313E132-71B5-4FE0-AADE-089BA2720B0D}" type="datetimeFigureOut">
               <a:rPr lang="en-US" smtClean="0"/>
-              <a:t>11/20/2024</a:t>
+              <a:t>11/22/2024</a:t>
             </a:fld>
             <a:endParaRPr lang="en-US"/>
           </a:p>
@@ -15866,7 +15868,7 @@
           <a:p>
             <a:fld id="{1313E132-71B5-4FE0-AADE-089BA2720B0D}" type="datetimeFigureOut">
               <a:rPr lang="en-US" smtClean="0"/>
-              <a:t>11/20/2024</a:t>
+              <a:t>11/22/2024</a:t>
             </a:fld>
             <a:endParaRPr lang="en-US"/>
           </a:p>
@@ -15979,7 +15981,7 @@
           <a:p>
             <a:fld id="{1313E132-71B5-4FE0-AADE-089BA2720B0D}" type="datetimeFigureOut">
               <a:rPr lang="en-US" smtClean="0"/>
-              <a:t>11/20/2024</a:t>
+              <a:t>11/22/2024</a:t>
             </a:fld>
             <a:endParaRPr lang="en-US"/>
           </a:p>
@@ -16290,7 +16292,7 @@
           <a:p>
             <a:fld id="{1313E132-71B5-4FE0-AADE-089BA2720B0D}" type="datetimeFigureOut">
               <a:rPr lang="en-US" smtClean="0"/>
-              <a:t>11/20/2024</a:t>
+              <a:t>11/22/2024</a:t>
             </a:fld>
             <a:endParaRPr lang="en-US"/>
           </a:p>
@@ -16578,7 +16580,7 @@
           <a:p>
             <a:fld id="{1313E132-71B5-4FE0-AADE-089BA2720B0D}" type="datetimeFigureOut">
               <a:rPr lang="en-US" smtClean="0"/>
-              <a:t>11/20/2024</a:t>
+              <a:t>11/22/2024</a:t>
             </a:fld>
             <a:endParaRPr lang="en-US"/>
           </a:p>
@@ -16819,7 +16821,7 @@
           <a:p>
             <a:fld id="{1313E132-71B5-4FE0-AADE-089BA2720B0D}" type="datetimeFigureOut">
               <a:rPr lang="en-US" smtClean="0"/>
-              <a:t>11/20/2024</a:t>
+              <a:t>11/22/2024</a:t>
             </a:fld>
             <a:endParaRPr lang="en-US"/>
           </a:p>
@@ -17456,7 +17458,13 @@
             <p:ph type="title"/>
           </p:nvPr>
         </p:nvSpPr>
-        <p:spPr/>
+        <p:spPr>
+          <a:solidFill>
+            <a:schemeClr val="bg1">
+              <a:lumMod val="85000"/>
+            </a:schemeClr>
+          </a:solidFill>
+        </p:spPr>
         <p:txBody>
           <a:bodyPr/>
           <a:lstStyle/>
@@ -17506,6 +17514,135 @@
     <p:extLst>
       <p:ext uri="{BB962C8B-B14F-4D97-AF65-F5344CB8AC3E}">
         <p14:creationId xmlns:p14="http://schemas.microsoft.com/office/powerpoint/2010/main" val="171364255"/>
+      </p:ext>
+    </p:extLst>
+  </p:cSld>
+  <p:clrMapOvr>
+    <a:masterClrMapping/>
+  </p:clrMapOvr>
+</p:sld>
+</file>
+
+<file path=ppt/slides/slide11.xml><?xml version="1.0" encoding="utf-8"?>
+<p:sld xmlns:a="http://schemas.openxmlformats.org/drawingml/2006/main" xmlns:r="http://schemas.openxmlformats.org/officeDocument/2006/relationships" xmlns:p="http://schemas.openxmlformats.org/presentationml/2006/main">
+  <p:cSld>
+    <p:spTree>
+      <p:nvGrpSpPr>
+        <p:cNvPr id="1" name=""/>
+        <p:cNvGrpSpPr/>
+        <p:nvPr/>
+      </p:nvGrpSpPr>
+      <p:grpSpPr>
+        <a:xfrm>
+          <a:off x="0" y="0"/>
+          <a:ext cx="0" cy="0"/>
+          <a:chOff x="0" y="0"/>
+          <a:chExt cx="0" cy="0"/>
+        </a:xfrm>
+      </p:grpSpPr>
+      <p:sp>
+        <p:nvSpPr>
+          <p:cNvPr id="2" name="Title 1">
+            <a:extLst>
+              <a:ext uri="{FF2B5EF4-FFF2-40B4-BE49-F238E27FC236}">
+                <a16:creationId xmlns:a16="http://schemas.microsoft.com/office/drawing/2014/main" id="{FE7672CA-F9E7-D76D-75C6-6E51B87E3DF7}"/>
+              </a:ext>
+            </a:extLst>
+          </p:cNvPr>
+          <p:cNvSpPr>
+            <a:spLocks noGrp="1"/>
+          </p:cNvSpPr>
+          <p:nvPr>
+            <p:ph type="title"/>
+          </p:nvPr>
+        </p:nvSpPr>
+        <p:spPr>
+          <a:solidFill>
+            <a:schemeClr val="accent2">
+              <a:lumMod val="60000"/>
+              <a:lumOff val="40000"/>
+            </a:schemeClr>
+          </a:solidFill>
+        </p:spPr>
+        <p:txBody>
+          <a:bodyPr/>
+          <a:lstStyle/>
+          <a:p>
+            <a:pPr algn="ctr"/>
+            <a:r>
+              <a:rPr lang="en-US" dirty="0"/>
+              <a:t>Git Pull</a:t>
+            </a:r>
+          </a:p>
+        </p:txBody>
+      </p:sp>
+      <p:sp>
+        <p:nvSpPr>
+          <p:cNvPr id="3" name="Content Placeholder 2">
+            <a:extLst>
+              <a:ext uri="{FF2B5EF4-FFF2-40B4-BE49-F238E27FC236}">
+                <a16:creationId xmlns:a16="http://schemas.microsoft.com/office/drawing/2014/main" id="{D2629279-2F3F-4BB4-465E-72F203BA24DE}"/>
+              </a:ext>
+            </a:extLst>
+          </p:cNvPr>
+          <p:cNvSpPr>
+            <a:spLocks noGrp="1"/>
+          </p:cNvSpPr>
+          <p:nvPr>
+            <p:ph sz="half" idx="1"/>
+          </p:nvPr>
+        </p:nvSpPr>
+        <p:spPr>
+          <a:xfrm>
+            <a:off x="838199" y="1825625"/>
+            <a:ext cx="10515599" cy="4351338"/>
+          </a:xfrm>
+          <a:solidFill>
+            <a:schemeClr val="accent3">
+              <a:lumMod val="20000"/>
+              <a:lumOff val="80000"/>
+            </a:schemeClr>
+          </a:solidFill>
+        </p:spPr>
+        <p:txBody>
+          <a:bodyPr anchor="ctr"/>
+          <a:lstStyle/>
+          <a:p>
+            <a:r>
+              <a:rPr lang="en-US" dirty="0"/>
+              <a:t>Copies files from the server to your workspace.</a:t>
+            </a:r>
+          </a:p>
+          <a:p>
+            <a:r>
+              <a:rPr lang="en-US" dirty="0"/>
+              <a:t>Keeps your repository up to date with changes</a:t>
+            </a:r>
+          </a:p>
+          <a:p>
+            <a:r>
+              <a:rPr lang="en-US" dirty="0"/>
+              <a:t>Performs 2 steps: (git fetch) (git merge)</a:t>
+            </a:r>
+          </a:p>
+          <a:p>
+            <a:r>
+              <a:rPr lang="en-US" dirty="0"/>
+              <a:t>Git fetch – downloads changes (without adding them to file system)</a:t>
+            </a:r>
+          </a:p>
+          <a:p>
+            <a:r>
+              <a:rPr lang="en-US" dirty="0"/>
+              <a:t>Git merge – merges those files onto your file system.</a:t>
+            </a:r>
+          </a:p>
+        </p:txBody>
+      </p:sp>
+    </p:spTree>
+    <p:extLst>
+      <p:ext uri="{BB962C8B-B14F-4D97-AF65-F5344CB8AC3E}">
+        <p14:creationId xmlns:p14="http://schemas.microsoft.com/office/powerpoint/2010/main" val="9972245"/>
       </p:ext>
     </p:extLst>
   </p:cSld>

</xml_diff>

<commit_message>
sixth commit (added Jesus)
</commit_message>
<xml_diff>
--- a/GitPresentation.pptx
+++ b/GitPresentation.pptx
@@ -5,24 +5,25 @@
     <p:sldMasterId id="2147483648" r:id="rId1"/>
   </p:sldMasterIdLst>
   <p:notesMasterIdLst>
-    <p:notesMasterId r:id="rId17"/>
+    <p:notesMasterId r:id="rId18"/>
   </p:notesMasterIdLst>
   <p:sldIdLst>
-    <p:sldId id="268" r:id="rId2"/>
-    <p:sldId id="269" r:id="rId3"/>
-    <p:sldId id="270" r:id="rId4"/>
-    <p:sldId id="256" r:id="rId5"/>
-    <p:sldId id="260" r:id="rId6"/>
-    <p:sldId id="257" r:id="rId7"/>
-    <p:sldId id="258" r:id="rId8"/>
-    <p:sldId id="261" r:id="rId9"/>
-    <p:sldId id="264" r:id="rId10"/>
-    <p:sldId id="262" r:id="rId11"/>
-    <p:sldId id="263" r:id="rId12"/>
-    <p:sldId id="265" r:id="rId13"/>
-    <p:sldId id="266" r:id="rId14"/>
-    <p:sldId id="267" r:id="rId15"/>
-    <p:sldId id="271" r:id="rId16"/>
+    <p:sldId id="272" r:id="rId2"/>
+    <p:sldId id="268" r:id="rId3"/>
+    <p:sldId id="269" r:id="rId4"/>
+    <p:sldId id="270" r:id="rId5"/>
+    <p:sldId id="256" r:id="rId6"/>
+    <p:sldId id="260" r:id="rId7"/>
+    <p:sldId id="257" r:id="rId8"/>
+    <p:sldId id="258" r:id="rId9"/>
+    <p:sldId id="261" r:id="rId10"/>
+    <p:sldId id="264" r:id="rId11"/>
+    <p:sldId id="262" r:id="rId12"/>
+    <p:sldId id="263" r:id="rId13"/>
+    <p:sldId id="265" r:id="rId14"/>
+    <p:sldId id="266" r:id="rId15"/>
+    <p:sldId id="267" r:id="rId16"/>
+    <p:sldId id="271" r:id="rId17"/>
   </p:sldIdLst>
   <p:sldSz cx="12192000" cy="6858000"/>
   <p:notesSz cx="6858000" cy="9144000"/>
@@ -126,6 +127,7 @@
       <p14:sectionLst xmlns:p14="http://schemas.microsoft.com/office/powerpoint/2010/main">
         <p14:section name="Default Section" id="{5A07D894-B1E5-478F-BA7E-6A81AF237C38}">
           <p14:sldIdLst>
+            <p14:sldId id="272"/>
             <p14:sldId id="268"/>
             <p14:sldId id="269"/>
             <p14:sldId id="270"/>
@@ -5724,7 +5726,7 @@
             <a:defRPr cap="all"/>
           </a:pPr>
           <a:r>
-            <a:rPr lang="en-US"/>
+            <a:rPr lang="en-US" dirty="0"/>
             <a:t>https://github.com/JoelAbbott/git-githubPresentation.git</a:t>
           </a:r>
         </a:p>
@@ -8692,7 +8694,7 @@
             <a:defRPr cap="all"/>
           </a:pPr>
           <a:r>
-            <a:rPr lang="en-US" sz="1600" kern="1200"/>
+            <a:rPr lang="en-US" sz="1600" kern="1200" dirty="0"/>
             <a:t>https://github.com/JoelAbbott/git-githubPresentation.git</a:t>
           </a:r>
         </a:p>
@@ -16767,7 +16769,7 @@
           <a:p>
             <a:fld id="{57202EEF-A7E0-4B11-9905-8AEFEC87D93F}" type="slidenum">
               <a:rPr lang="en-US" smtClean="0"/>
-              <a:t>6</a:t>
+              <a:t>7</a:t>
             </a:fld>
             <a:endParaRPr lang="en-US"/>
           </a:p>
@@ -20002,10 +20004,120 @@
       </p:grpSpPr>
       <p:sp>
         <p:nvSpPr>
+          <p:cNvPr id="3" name="Content Placeholder 2">
+            <a:extLst>
+              <a:ext uri="{FF2B5EF4-FFF2-40B4-BE49-F238E27FC236}">
+                <a16:creationId xmlns:a16="http://schemas.microsoft.com/office/drawing/2014/main" id="{B519A354-DB5E-FACB-CC32-573B064E5393}"/>
+              </a:ext>
+            </a:extLst>
+          </p:cNvPr>
+          <p:cNvSpPr>
+            <a:spLocks noGrp="1"/>
+          </p:cNvSpPr>
+          <p:nvPr>
+            <p:ph idx="1"/>
+          </p:nvPr>
+        </p:nvSpPr>
+        <p:spPr>
+          <a:xfrm>
+            <a:off x="838200" y="4830945"/>
+            <a:ext cx="10515600" cy="1346017"/>
+          </a:xfrm>
+        </p:spPr>
+        <p:txBody>
+          <a:bodyPr>
+            <a:normAutofit fontScale="92500" lnSpcReduction="20000"/>
+          </a:bodyPr>
+          <a:lstStyle/>
+          <a:p>
+            <a:pPr marL="0" indent="0" algn="ctr">
+              <a:buNone/>
+            </a:pPr>
+            <a:r>
+              <a:rPr lang="en-US" i="1" dirty="0"/>
+              <a:t>"Truly I say to you, my disciples, the key to spreading your work across the nations is learning GitHub. For it is through commits and pushes that your creations shall endure for eternity."</a:t>
+            </a:r>
+            <a:br>
+              <a:rPr lang="en-US" dirty="0"/>
+            </a:br>
+            <a:r>
+              <a:rPr lang="en-US" dirty="0"/>
+              <a:t>— Jesus, </a:t>
+            </a:r>
+            <a:r>
+              <a:rPr lang="en-US" b="1" dirty="0"/>
+              <a:t>AD 33</a:t>
+            </a:r>
+            <a:endParaRPr lang="en-US" dirty="0"/>
+          </a:p>
+        </p:txBody>
+      </p:sp>
+      <p:pic>
+        <p:nvPicPr>
+          <p:cNvPr id="4" name="Picture 3">
+            <a:extLst>
+              <a:ext uri="{FF2B5EF4-FFF2-40B4-BE49-F238E27FC236}">
+                <a16:creationId xmlns:a16="http://schemas.microsoft.com/office/drawing/2014/main" id="{9764E650-3AA7-908A-F443-DCF96743E0F8}"/>
+              </a:ext>
+            </a:extLst>
+          </p:cNvPr>
+          <p:cNvPicPr>
+            <a:picLocks noChangeAspect="1"/>
+          </p:cNvPicPr>
+          <p:nvPr/>
+        </p:nvPicPr>
+        <p:blipFill>
+          <a:blip r:embed="rId2"/>
+          <a:stretch>
+            <a:fillRect/>
+          </a:stretch>
+        </p:blipFill>
+        <p:spPr>
+          <a:xfrm>
+            <a:off x="0" y="0"/>
+            <a:ext cx="12192000" cy="4682984"/>
+          </a:xfrm>
+          <a:prstGeom prst="rect">
+            <a:avLst/>
+          </a:prstGeom>
+        </p:spPr>
+      </p:pic>
+    </p:spTree>
+    <p:extLst>
+      <p:ext uri="{BB962C8B-B14F-4D97-AF65-F5344CB8AC3E}">
+        <p14:creationId xmlns:p14="http://schemas.microsoft.com/office/powerpoint/2010/main" val="1544056796"/>
+      </p:ext>
+    </p:extLst>
+  </p:cSld>
+  <p:clrMapOvr>
+    <a:masterClrMapping/>
+  </p:clrMapOvr>
+</p:sld>
+</file>
+
+<file path=ppt/slides/slide10.xml><?xml version="1.0" encoding="utf-8"?>
+<p:sld xmlns:a="http://schemas.openxmlformats.org/drawingml/2006/main" xmlns:r="http://schemas.openxmlformats.org/officeDocument/2006/relationships" xmlns:p="http://schemas.openxmlformats.org/presentationml/2006/main">
+  <p:cSld>
+    <p:spTree>
+      <p:nvGrpSpPr>
+        <p:cNvPr id="1" name=""/>
+        <p:cNvGrpSpPr/>
+        <p:nvPr/>
+      </p:nvGrpSpPr>
+      <p:grpSpPr>
+        <a:xfrm>
+          <a:off x="0" y="0"/>
+          <a:ext cx="0" cy="0"/>
+          <a:chOff x="0" y="0"/>
+          <a:chExt cx="0" cy="0"/>
+        </a:xfrm>
+      </p:grpSpPr>
+      <p:sp>
+        <p:nvSpPr>
           <p:cNvPr id="2" name="Title 1">
             <a:extLst>
               <a:ext uri="{FF2B5EF4-FFF2-40B4-BE49-F238E27FC236}">
-                <a16:creationId xmlns:a16="http://schemas.microsoft.com/office/drawing/2014/main" id="{91AB72F6-7B76-CD11-150D-641BCE44EBF1}"/>
+                <a16:creationId xmlns:a16="http://schemas.microsoft.com/office/drawing/2014/main" id="{A289BDD6-31D0-5921-5570-32B9D025B8B8}"/>
               </a:ext>
             </a:extLst>
           </p:cNvPr>
@@ -20016,54 +20128,59 @@
             <p:ph type="title"/>
           </p:nvPr>
         </p:nvSpPr>
-        <p:spPr/>
+        <p:spPr>
+          <a:solidFill>
+            <a:schemeClr val="bg2">
+              <a:lumMod val="75000"/>
+            </a:schemeClr>
+          </a:solidFill>
+        </p:spPr>
         <p:txBody>
           <a:bodyPr/>
           <a:lstStyle/>
           <a:p>
-            <a:endParaRPr lang="en-US"/>
+            <a:r>
+              <a:rPr lang="en-US" dirty="0"/>
+              <a:t>Configure Git Through PowerShell</a:t>
+            </a:r>
           </a:p>
         </p:txBody>
       </p:sp>
-      <p:pic>
-        <p:nvPicPr>
-          <p:cNvPr id="5" name="Content Placeholder 4" descr="A close-up of a computer&#10;&#10;Description automatically generated">
+      <p:graphicFrame>
+        <p:nvGraphicFramePr>
+          <p:cNvPr id="5" name="Content Placeholder 2">
             <a:extLst>
               <a:ext uri="{FF2B5EF4-FFF2-40B4-BE49-F238E27FC236}">
-                <a16:creationId xmlns:a16="http://schemas.microsoft.com/office/drawing/2014/main" id="{C52F0E46-2006-FFA6-2799-FB7B9396BBB3}"/>
+                <a16:creationId xmlns:a16="http://schemas.microsoft.com/office/drawing/2014/main" id="{0A42AA9E-A02A-FC9D-A11B-019248AF102B}"/>
               </a:ext>
             </a:extLst>
           </p:cNvPr>
-          <p:cNvPicPr>
-            <a:picLocks noGrp="1" noChangeAspect="1"/>
-          </p:cNvPicPr>
+          <p:cNvGraphicFramePr>
+            <a:graphicFrameLocks noGrp="1"/>
+          </p:cNvGraphicFramePr>
           <p:nvPr>
-            <p:ph idx="1"/>
+            <p:ph sz="half" idx="1"/>
+            <p:extLst>
+              <p:ext uri="{D42A27DB-BD31-4B8C-83A1-F6EECF244321}">
+                <p14:modId xmlns:p14="http://schemas.microsoft.com/office/powerpoint/2010/main" val="3286300738"/>
+              </p:ext>
+            </p:extLst>
           </p:nvPr>
-        </p:nvPicPr>
-        <p:blipFill>
-          <a:blip r:embed="rId2">
-            <a:extLst>
-              <a:ext uri="{28A0092B-C50C-407E-A947-70E740481C1C}">
-                <a14:useLocalDpi xmlns:a14="http://schemas.microsoft.com/office/drawing/2010/main" val="0"/>
-              </a:ext>
-            </a:extLst>
-          </a:blip>
-          <a:stretch>
-            <a:fillRect/>
-          </a:stretch>
-        </p:blipFill>
-        <p:spPr>
-          <a:xfrm>
-            <a:off x="0" y="0"/>
-            <a:ext cx="12112387" cy="6858000"/>
-          </a:xfrm>
-        </p:spPr>
-      </p:pic>
+        </p:nvGraphicFramePr>
+        <p:xfrm>
+          <a:off x="838200" y="1825625"/>
+          <a:ext cx="10611678" cy="4351338"/>
+        </p:xfrm>
+        <a:graphic>
+          <a:graphicData uri="http://schemas.openxmlformats.org/drawingml/2006/diagram">
+            <dgm:relIds xmlns:dgm="http://schemas.openxmlformats.org/drawingml/2006/diagram" xmlns:r="http://schemas.openxmlformats.org/officeDocument/2006/relationships" r:dm="rId2" r:lo="rId3" r:qs="rId4" r:cs="rId5"/>
+          </a:graphicData>
+        </a:graphic>
+      </p:graphicFrame>
     </p:spTree>
     <p:extLst>
       <p:ext uri="{BB962C8B-B14F-4D97-AF65-F5344CB8AC3E}">
-        <p14:creationId xmlns:p14="http://schemas.microsoft.com/office/powerpoint/2010/main" val="3012357891"/>
+        <p14:creationId xmlns:p14="http://schemas.microsoft.com/office/powerpoint/2010/main" val="1919929085"/>
       </p:ext>
     </p:extLst>
   </p:cSld>
@@ -20073,7 +20190,7 @@
 </p:sld>
 </file>
 
-<file path=ppt/slides/slide10.xml><?xml version="1.0" encoding="utf-8"?>
+<file path=ppt/slides/slide11.xml><?xml version="1.0" encoding="utf-8"?>
 <p:sld xmlns:a="http://schemas.openxmlformats.org/drawingml/2006/main" xmlns:r="http://schemas.openxmlformats.org/officeDocument/2006/relationships" xmlns:p="http://schemas.openxmlformats.org/presentationml/2006/main">
   <p:cSld>
     <p:bg>
@@ -20932,7 +21049,7 @@
 </p:sld>
 </file>
 
-<file path=ppt/slides/slide11.xml><?xml version="1.0" encoding="utf-8"?>
+<file path=ppt/slides/slide12.xml><?xml version="1.0" encoding="utf-8"?>
 <p:sld xmlns:a="http://schemas.openxmlformats.org/drawingml/2006/main" xmlns:r="http://schemas.openxmlformats.org/officeDocument/2006/relationships" xmlns:p="http://schemas.openxmlformats.org/presentationml/2006/main">
   <p:cSld>
     <p:spTree>
@@ -21491,7 +21608,7 @@
 </p:sld>
 </file>
 
-<file path=ppt/slides/slide12.xml><?xml version="1.0" encoding="utf-8"?>
+<file path=ppt/slides/slide13.xml><?xml version="1.0" encoding="utf-8"?>
 <p:sld xmlns:a="http://schemas.openxmlformats.org/drawingml/2006/main" xmlns:r="http://schemas.openxmlformats.org/officeDocument/2006/relationships" xmlns:p="http://schemas.openxmlformats.org/presentationml/2006/main">
   <p:cSld>
     <p:bg>
@@ -22100,7 +22217,7 @@
 </p:sld>
 </file>
 
-<file path=ppt/slides/slide13.xml><?xml version="1.0" encoding="utf-8"?>
+<file path=ppt/slides/slide14.xml><?xml version="1.0" encoding="utf-8"?>
 <p:sld xmlns:a="http://schemas.openxmlformats.org/drawingml/2006/main" xmlns:r="http://schemas.openxmlformats.org/officeDocument/2006/relationships" xmlns:p="http://schemas.openxmlformats.org/presentationml/2006/main">
   <p:cSld>
     <p:spTree>
@@ -22198,7 +22315,7 @@
 </p:sld>
 </file>
 
-<file path=ppt/slides/slide14.xml><?xml version="1.0" encoding="utf-8"?>
+<file path=ppt/slides/slide15.xml><?xml version="1.0" encoding="utf-8"?>
 <p:sld xmlns:a="http://schemas.openxmlformats.org/drawingml/2006/main" xmlns:r="http://schemas.openxmlformats.org/officeDocument/2006/relationships" xmlns:p="http://schemas.openxmlformats.org/presentationml/2006/main">
   <p:cSld>
     <p:spTree>
@@ -22327,7 +22444,7 @@
 </p:sld>
 </file>
 
-<file path=ppt/slides/slide15.xml><?xml version="1.0" encoding="utf-8"?>
+<file path=ppt/slides/slide16.xml><?xml version="1.0" encoding="utf-8"?>
 <p:sld xmlns:a="http://schemas.openxmlformats.org/drawingml/2006/main" xmlns:r="http://schemas.openxmlformats.org/officeDocument/2006/relationships" xmlns:p="http://schemas.openxmlformats.org/presentationml/2006/main">
   <p:cSld>
     <p:bg>
@@ -22762,6 +22879,96 @@
           <p:cNvPr id="2" name="Title 1">
             <a:extLst>
               <a:ext uri="{FF2B5EF4-FFF2-40B4-BE49-F238E27FC236}">
+                <a16:creationId xmlns:a16="http://schemas.microsoft.com/office/drawing/2014/main" id="{91AB72F6-7B76-CD11-150D-641BCE44EBF1}"/>
+              </a:ext>
+            </a:extLst>
+          </p:cNvPr>
+          <p:cNvSpPr>
+            <a:spLocks noGrp="1"/>
+          </p:cNvSpPr>
+          <p:nvPr>
+            <p:ph type="title"/>
+          </p:nvPr>
+        </p:nvSpPr>
+        <p:spPr/>
+        <p:txBody>
+          <a:bodyPr/>
+          <a:lstStyle/>
+          <a:p>
+            <a:endParaRPr lang="en-US"/>
+          </a:p>
+        </p:txBody>
+      </p:sp>
+      <p:pic>
+        <p:nvPicPr>
+          <p:cNvPr id="5" name="Content Placeholder 4" descr="A close-up of a computer&#10;&#10;Description automatically generated">
+            <a:extLst>
+              <a:ext uri="{FF2B5EF4-FFF2-40B4-BE49-F238E27FC236}">
+                <a16:creationId xmlns:a16="http://schemas.microsoft.com/office/drawing/2014/main" id="{C52F0E46-2006-FFA6-2799-FB7B9396BBB3}"/>
+              </a:ext>
+            </a:extLst>
+          </p:cNvPr>
+          <p:cNvPicPr>
+            <a:picLocks noGrp="1" noChangeAspect="1"/>
+          </p:cNvPicPr>
+          <p:nvPr>
+            <p:ph idx="1"/>
+          </p:nvPr>
+        </p:nvPicPr>
+        <p:blipFill>
+          <a:blip r:embed="rId2">
+            <a:extLst>
+              <a:ext uri="{28A0092B-C50C-407E-A947-70E740481C1C}">
+                <a14:useLocalDpi xmlns:a14="http://schemas.microsoft.com/office/drawing/2010/main" val="0"/>
+              </a:ext>
+            </a:extLst>
+          </a:blip>
+          <a:stretch>
+            <a:fillRect/>
+          </a:stretch>
+        </p:blipFill>
+        <p:spPr>
+          <a:xfrm>
+            <a:off x="0" y="0"/>
+            <a:ext cx="12112387" cy="6858000"/>
+          </a:xfrm>
+        </p:spPr>
+      </p:pic>
+    </p:spTree>
+    <p:extLst>
+      <p:ext uri="{BB962C8B-B14F-4D97-AF65-F5344CB8AC3E}">
+        <p14:creationId xmlns:p14="http://schemas.microsoft.com/office/powerpoint/2010/main" val="3012357891"/>
+      </p:ext>
+    </p:extLst>
+  </p:cSld>
+  <p:clrMapOvr>
+    <a:masterClrMapping/>
+  </p:clrMapOvr>
+</p:sld>
+</file>
+
+<file path=ppt/slides/slide3.xml><?xml version="1.0" encoding="utf-8"?>
+<p:sld xmlns:a="http://schemas.openxmlformats.org/drawingml/2006/main" xmlns:r="http://schemas.openxmlformats.org/officeDocument/2006/relationships" xmlns:p="http://schemas.openxmlformats.org/presentationml/2006/main">
+  <p:cSld>
+    <p:spTree>
+      <p:nvGrpSpPr>
+        <p:cNvPr id="1" name=""/>
+        <p:cNvGrpSpPr/>
+        <p:nvPr/>
+      </p:nvGrpSpPr>
+      <p:grpSpPr>
+        <a:xfrm>
+          <a:off x="0" y="0"/>
+          <a:ext cx="0" cy="0"/>
+          <a:chOff x="0" y="0"/>
+          <a:chExt cx="0" cy="0"/>
+        </a:xfrm>
+      </p:grpSpPr>
+      <p:sp>
+        <p:nvSpPr>
+          <p:cNvPr id="2" name="Title 1">
+            <a:extLst>
+              <a:ext uri="{FF2B5EF4-FFF2-40B4-BE49-F238E27FC236}">
                 <a16:creationId xmlns:a16="http://schemas.microsoft.com/office/drawing/2014/main" id="{1C66E46F-0338-B148-002B-AC35A08E79B0}"/>
               </a:ext>
             </a:extLst>
@@ -22830,7 +23037,7 @@
 </p:sld>
 </file>
 
-<file path=ppt/slides/slide3.xml><?xml version="1.0" encoding="utf-8"?>
+<file path=ppt/slides/slide4.xml><?xml version="1.0" encoding="utf-8"?>
 <p:sld xmlns:a="http://schemas.openxmlformats.org/drawingml/2006/main" xmlns:r="http://schemas.openxmlformats.org/officeDocument/2006/relationships" xmlns:p="http://schemas.openxmlformats.org/presentationml/2006/main">
   <p:cSld>
     <p:spTree>
@@ -22920,7 +23127,7 @@
 </p:sld>
 </file>
 
-<file path=ppt/slides/slide4.xml><?xml version="1.0" encoding="utf-8"?>
+<file path=ppt/slides/slide5.xml><?xml version="1.0" encoding="utf-8"?>
 <p:sld xmlns:a="http://schemas.openxmlformats.org/drawingml/2006/main" xmlns:r="http://schemas.openxmlformats.org/officeDocument/2006/relationships" xmlns:p="http://schemas.openxmlformats.org/presentationml/2006/main">
   <p:cSld>
     <p:spTree>
@@ -23124,7 +23331,7 @@
 </p:sld>
 </file>
 
-<file path=ppt/slides/slide5.xml><?xml version="1.0" encoding="utf-8"?>
+<file path=ppt/slides/slide6.xml><?xml version="1.0" encoding="utf-8"?>
 <p:sld xmlns:a="http://schemas.openxmlformats.org/drawingml/2006/main" xmlns:r="http://schemas.openxmlformats.org/officeDocument/2006/relationships" xmlns:p="http://schemas.openxmlformats.org/presentationml/2006/main">
   <p:cSld>
     <p:spTree>
@@ -23340,7 +23547,7 @@
 </p:sld>
 </file>
 
-<file path=ppt/slides/slide6.xml><?xml version="1.0" encoding="utf-8"?>
+<file path=ppt/slides/slide7.xml><?xml version="1.0" encoding="utf-8"?>
 <p:sld xmlns:a="http://schemas.openxmlformats.org/drawingml/2006/main" xmlns:r="http://schemas.openxmlformats.org/officeDocument/2006/relationships" xmlns:p="http://schemas.openxmlformats.org/presentationml/2006/main">
   <p:cSld>
     <p:spTree>
@@ -23563,7 +23770,7 @@
 </p:sld>
 </file>
 
-<file path=ppt/slides/slide7.xml><?xml version="1.0" encoding="utf-8"?>
+<file path=ppt/slides/slide8.xml><?xml version="1.0" encoding="utf-8"?>
 <p:sld xmlns:a="http://schemas.openxmlformats.org/drawingml/2006/main" xmlns:r="http://schemas.openxmlformats.org/officeDocument/2006/relationships" xmlns:p="http://schemas.openxmlformats.org/presentationml/2006/main">
   <p:cSld>
     <p:spTree>
@@ -24893,7 +25100,7 @@
 </p:sld>
 </file>
 
-<file path=ppt/slides/slide8.xml><?xml version="1.0" encoding="utf-8"?>
+<file path=ppt/slides/slide9.xml><?xml version="1.0" encoding="utf-8"?>
 <p:sld xmlns:a="http://schemas.openxmlformats.org/drawingml/2006/main" xmlns:r="http://schemas.openxmlformats.org/officeDocument/2006/relationships" xmlns:p="http://schemas.openxmlformats.org/presentationml/2006/main">
   <p:cSld>
     <p:spTree>
@@ -25325,101 +25532,6 @@
     <p:extLst>
       <p:ext uri="{BB962C8B-B14F-4D97-AF65-F5344CB8AC3E}">
         <p14:creationId xmlns:p14="http://schemas.microsoft.com/office/powerpoint/2010/main" val="477036650"/>
-      </p:ext>
-    </p:extLst>
-  </p:cSld>
-  <p:clrMapOvr>
-    <a:masterClrMapping/>
-  </p:clrMapOvr>
-</p:sld>
-</file>
-
-<file path=ppt/slides/slide9.xml><?xml version="1.0" encoding="utf-8"?>
-<p:sld xmlns:a="http://schemas.openxmlformats.org/drawingml/2006/main" xmlns:r="http://schemas.openxmlformats.org/officeDocument/2006/relationships" xmlns:p="http://schemas.openxmlformats.org/presentationml/2006/main">
-  <p:cSld>
-    <p:spTree>
-      <p:nvGrpSpPr>
-        <p:cNvPr id="1" name=""/>
-        <p:cNvGrpSpPr/>
-        <p:nvPr/>
-      </p:nvGrpSpPr>
-      <p:grpSpPr>
-        <a:xfrm>
-          <a:off x="0" y="0"/>
-          <a:ext cx="0" cy="0"/>
-          <a:chOff x="0" y="0"/>
-          <a:chExt cx="0" cy="0"/>
-        </a:xfrm>
-      </p:grpSpPr>
-      <p:sp>
-        <p:nvSpPr>
-          <p:cNvPr id="2" name="Title 1">
-            <a:extLst>
-              <a:ext uri="{FF2B5EF4-FFF2-40B4-BE49-F238E27FC236}">
-                <a16:creationId xmlns:a16="http://schemas.microsoft.com/office/drawing/2014/main" id="{A289BDD6-31D0-5921-5570-32B9D025B8B8}"/>
-              </a:ext>
-            </a:extLst>
-          </p:cNvPr>
-          <p:cNvSpPr>
-            <a:spLocks noGrp="1"/>
-          </p:cNvSpPr>
-          <p:nvPr>
-            <p:ph type="title"/>
-          </p:nvPr>
-        </p:nvSpPr>
-        <p:spPr>
-          <a:solidFill>
-            <a:schemeClr val="bg2">
-              <a:lumMod val="75000"/>
-            </a:schemeClr>
-          </a:solidFill>
-        </p:spPr>
-        <p:txBody>
-          <a:bodyPr/>
-          <a:lstStyle/>
-          <a:p>
-            <a:r>
-              <a:rPr lang="en-US" dirty="0"/>
-              <a:t>Configure Git Through PowerShell</a:t>
-            </a:r>
-          </a:p>
-        </p:txBody>
-      </p:sp>
-      <p:graphicFrame>
-        <p:nvGraphicFramePr>
-          <p:cNvPr id="5" name="Content Placeholder 2">
-            <a:extLst>
-              <a:ext uri="{FF2B5EF4-FFF2-40B4-BE49-F238E27FC236}">
-                <a16:creationId xmlns:a16="http://schemas.microsoft.com/office/drawing/2014/main" id="{0A42AA9E-A02A-FC9D-A11B-019248AF102B}"/>
-              </a:ext>
-            </a:extLst>
-          </p:cNvPr>
-          <p:cNvGraphicFramePr>
-            <a:graphicFrameLocks noGrp="1"/>
-          </p:cNvGraphicFramePr>
-          <p:nvPr>
-            <p:ph sz="half" idx="1"/>
-            <p:extLst>
-              <p:ext uri="{D42A27DB-BD31-4B8C-83A1-F6EECF244321}">
-                <p14:modId xmlns:p14="http://schemas.microsoft.com/office/powerpoint/2010/main" val="3286300738"/>
-              </p:ext>
-            </p:extLst>
-          </p:nvPr>
-        </p:nvGraphicFramePr>
-        <p:xfrm>
-          <a:off x="838200" y="1825625"/>
-          <a:ext cx="10611678" cy="4351338"/>
-        </p:xfrm>
-        <a:graphic>
-          <a:graphicData uri="http://schemas.openxmlformats.org/drawingml/2006/diagram">
-            <dgm:relIds xmlns:dgm="http://schemas.openxmlformats.org/drawingml/2006/diagram" xmlns:r="http://schemas.openxmlformats.org/officeDocument/2006/relationships" r:dm="rId2" r:lo="rId3" r:qs="rId4" r:cs="rId5"/>
-          </a:graphicData>
-        </a:graphic>
-      </p:graphicFrame>
-    </p:spTree>
-    <p:extLst>
-      <p:ext uri="{BB962C8B-B14F-4D97-AF65-F5344CB8AC3E}">
-        <p14:creationId xmlns:p14="http://schemas.microsoft.com/office/powerpoint/2010/main" val="1919929085"/>
       </p:ext>
     </p:extLst>
   </p:cSld>

</xml_diff>